<commit_message>
Corrected an error in the powerpoint
</commit_message>
<xml_diff>
--- a/2006_Pikes_Peak_10k_Race_analysis.pptx
+++ b/2006_Pikes_Peak_10k_Race_analysis.pptx
@@ -253,7 +253,7 @@
           <a:p>
             <a:fld id="{6E5C0719-993D-42E1-80ED-8F01056F36C2}" type="datetimeFigureOut">
               <a:rPr lang="en-US" smtClean="0"/>
-              <a:t>6/16/21</a:t>
+              <a:t>6/18/21</a:t>
             </a:fld>
             <a:endParaRPr lang="en-US" dirty="0"/>
           </a:p>
@@ -430,7 +430,7 @@
           <a:p>
             <a:fld id="{21D3BC9C-6C58-464F-B94E-FD73C5FB016E}" type="datetimeFigureOut">
               <a:rPr lang="en-US" smtClean="0"/>
-              <a:t>6/16/21</a:t>
+              <a:t>6/18/21</a:t>
             </a:fld>
             <a:endParaRPr lang="en-US" dirty="0"/>
           </a:p>
@@ -1516,7 +1516,7 @@
           <a:p>
             <a:fld id="{40DA1498-92C7-4E4B-8045-C9195F453964}" type="datetimeFigureOut">
               <a:rPr lang="en-US" smtClean="0"/>
-              <a:t>6/16/21</a:t>
+              <a:t>6/18/21</a:t>
             </a:fld>
             <a:endParaRPr lang="en-US" dirty="0"/>
           </a:p>
@@ -1714,7 +1714,7 @@
           <a:p>
             <a:fld id="{40DA1498-92C7-4E4B-8045-C9195F453964}" type="datetimeFigureOut">
               <a:rPr lang="en-US" smtClean="0"/>
-              <a:t>6/16/21</a:t>
+              <a:t>6/18/21</a:t>
             </a:fld>
             <a:endParaRPr lang="en-US" dirty="0"/>
           </a:p>
@@ -1922,7 +1922,7 @@
           <a:p>
             <a:fld id="{40DA1498-92C7-4E4B-8045-C9195F453964}" type="datetimeFigureOut">
               <a:rPr lang="en-US" smtClean="0"/>
-              <a:t>6/16/21</a:t>
+              <a:t>6/18/21</a:t>
             </a:fld>
             <a:endParaRPr lang="en-US" dirty="0"/>
           </a:p>
@@ -2120,7 +2120,7 @@
           <a:p>
             <a:fld id="{40DA1498-92C7-4E4B-8045-C9195F453964}" type="datetimeFigureOut">
               <a:rPr lang="en-US" smtClean="0"/>
-              <a:t>6/16/21</a:t>
+              <a:t>6/18/21</a:t>
             </a:fld>
             <a:endParaRPr lang="en-US" dirty="0"/>
           </a:p>
@@ -2395,7 +2395,7 @@
           <a:p>
             <a:fld id="{40DA1498-92C7-4E4B-8045-C9195F453964}" type="datetimeFigureOut">
               <a:rPr lang="en-US" smtClean="0"/>
-              <a:t>6/16/21</a:t>
+              <a:t>6/18/21</a:t>
             </a:fld>
             <a:endParaRPr lang="en-US" dirty="0"/>
           </a:p>
@@ -2660,7 +2660,7 @@
           <a:p>
             <a:fld id="{40DA1498-92C7-4E4B-8045-C9195F453964}" type="datetimeFigureOut">
               <a:rPr lang="en-US" smtClean="0"/>
-              <a:t>6/16/21</a:t>
+              <a:t>6/18/21</a:t>
             </a:fld>
             <a:endParaRPr lang="en-US" dirty="0"/>
           </a:p>
@@ -3072,7 +3072,7 @@
           <a:p>
             <a:fld id="{40DA1498-92C7-4E4B-8045-C9195F453964}" type="datetimeFigureOut">
               <a:rPr lang="en-US" smtClean="0"/>
-              <a:t>6/16/21</a:t>
+              <a:t>6/18/21</a:t>
             </a:fld>
             <a:endParaRPr lang="en-US" dirty="0"/>
           </a:p>
@@ -3213,7 +3213,7 @@
           <a:p>
             <a:fld id="{40DA1498-92C7-4E4B-8045-C9195F453964}" type="datetimeFigureOut">
               <a:rPr lang="en-US" smtClean="0"/>
-              <a:t>6/16/21</a:t>
+              <a:t>6/18/21</a:t>
             </a:fld>
             <a:endParaRPr lang="en-US" dirty="0"/>
           </a:p>
@@ -3326,7 +3326,7 @@
           <a:p>
             <a:fld id="{40DA1498-92C7-4E4B-8045-C9195F453964}" type="datetimeFigureOut">
               <a:rPr lang="en-US" smtClean="0"/>
-              <a:t>6/16/21</a:t>
+              <a:t>6/18/21</a:t>
             </a:fld>
             <a:endParaRPr lang="en-US" dirty="0"/>
           </a:p>
@@ -3637,7 +3637,7 @@
           <a:p>
             <a:fld id="{40DA1498-92C7-4E4B-8045-C9195F453964}" type="datetimeFigureOut">
               <a:rPr lang="en-US" smtClean="0"/>
-              <a:t>6/16/21</a:t>
+              <a:t>6/18/21</a:t>
             </a:fld>
             <a:endParaRPr lang="en-US" dirty="0"/>
           </a:p>
@@ -3929,7 +3929,7 @@
           <a:p>
             <a:fld id="{40DA1498-92C7-4E4B-8045-C9195F453964}" type="datetimeFigureOut">
               <a:rPr lang="en-US" smtClean="0"/>
-              <a:t>6/16/21</a:t>
+              <a:t>6/18/21</a:t>
             </a:fld>
             <a:endParaRPr lang="en-US" dirty="0"/>
           </a:p>
@@ -4170,7 +4170,7 @@
           <a:p>
             <a:fld id="{40DA1498-92C7-4E4B-8045-C9195F453964}" type="datetimeFigureOut">
               <a:rPr lang="en-US" smtClean="0"/>
-              <a:t>6/16/21</a:t>
+              <a:t>6/18/21</a:t>
             </a:fld>
             <a:endParaRPr lang="en-US" dirty="0"/>
           </a:p>
@@ -15957,6 +15957,15 @@
             <a:r>
               <a:rPr lang="en-US" sz="2200" dirty="0">
                 <a:solidFill>
+                  <a:srgbClr val="FF0000"/>
+                </a:solidFill>
+                <a:cs typeface="Segoe UI" panose="020B0502040204020203" pitchFamily="34" charset="0"/>
+              </a:rPr>
+              <a:t>Pace</a:t>
+            </a:r>
+            <a:r>
+              <a:rPr lang="en-US" sz="2200" dirty="0">
+                <a:solidFill>
                   <a:schemeClr val="tx1">
                     <a:lumMod val="75000"/>
                     <a:lumOff val="25000"/>
@@ -15964,7 +15973,7 @@
                 </a:solidFill>
                 <a:cs typeface="Segoe UI" panose="020B0502040204020203" pitchFamily="34" charset="0"/>
               </a:rPr>
-              <a:t>Pace – Racer’s average time per mile during this race.</a:t>
+              <a:t> – Racer’s average time per mile during this race.</a:t>
             </a:r>
           </a:p>
         </p:txBody>
@@ -30669,15 +30678,6 @@
 </file>
 
 <file path=customXml/item1.xml><?xml version="1.0" encoding="utf-8"?>
-<?mso-contentType ?>
-<FormTemplates xmlns="http://schemas.microsoft.com/sharepoint/v3/contenttype/forms">
-  <Display>DocumentLibraryForm</Display>
-  <Edit>DocumentLibraryForm</Edit>
-  <New>DocumentLibraryForm</New>
-</FormTemplates>
-</file>
-
-<file path=customXml/item2.xml><?xml version="1.0" encoding="utf-8"?>
 <ct:contentTypeSchema xmlns:ct="http://schemas.microsoft.com/office/2006/metadata/contentType" xmlns:ma="http://schemas.microsoft.com/office/2006/metadata/properties/metaAttributes" ct:_="" ma:_="" ma:contentTypeName="Document" ma:contentTypeID="0x01010079F111ED35F8CC479449609E8A0923A6" ma:contentTypeVersion="11" ma:contentTypeDescription="Create a new document." ma:contentTypeScope="" ma:versionID="9677210f24a1be23c92c90fd886aa0aa">
   <xsd:schema xmlns:xsd="http://www.w3.org/2001/XMLSchema" xmlns:xs="http://www.w3.org/2001/XMLSchema" xmlns:p="http://schemas.microsoft.com/office/2006/metadata/properties" xmlns:ns2="71af3243-3dd4-4a8d-8c0d-dd76da1f02a5" xmlns:ns3="16c05727-aa75-4e4a-9b5f-8a80a1165891" targetNamespace="http://schemas.microsoft.com/office/2006/metadata/properties" ma:root="true" ma:fieldsID="60e05723c5c1908df1a1a4ebf11d344e" ns2:_="" ns3:_="">
     <xsd:import namespace="71af3243-3dd4-4a8d-8c0d-dd76da1f02a5"/>
@@ -30888,6 +30888,15 @@
 </ct:contentTypeSchema>
 </file>
 
+<file path=customXml/item2.xml><?xml version="1.0" encoding="utf-8"?>
+<?mso-contentType ?>
+<FormTemplates xmlns="http://schemas.microsoft.com/sharepoint/v3/contenttype/forms">
+  <Display>DocumentLibraryForm</Display>
+  <Edit>DocumentLibraryForm</Edit>
+  <New>DocumentLibraryForm</New>
+</FormTemplates>
+</file>
+
 <file path=customXml/item3.xml><?xml version="1.0" encoding="utf-8"?>
 <p:properties xmlns:p="http://schemas.microsoft.com/office/2006/metadata/properties" xmlns:xsi="http://www.w3.org/2001/XMLSchema-instance" xmlns:pc="http://schemas.microsoft.com/office/infopath/2007/PartnerControls">
   <documentManagement>
@@ -30897,14 +30906,6 @@
 </file>
 
 <file path=customXml/itemProps1.xml><?xml version="1.0" encoding="utf-8"?>
-<ds:datastoreItem xmlns:ds="http://schemas.openxmlformats.org/officeDocument/2006/customXml" ds:itemID="{2FD05317-60D6-4B3A-8545-888496D1A8EC}">
-  <ds:schemaRefs>
-    <ds:schemaRef ds:uri="http://schemas.microsoft.com/sharepoint/v3/contenttype/forms"/>
-  </ds:schemaRefs>
-</ds:datastoreItem>
-</file>
-
-<file path=customXml/itemProps2.xml><?xml version="1.0" encoding="utf-8"?>
 <ds:datastoreItem xmlns:ds="http://schemas.openxmlformats.org/officeDocument/2006/customXml" ds:itemID="{61A00BBF-EEBB-4E18-B8CB-F926EAAC48F7}">
   <ds:schemaRefs>
     <ds:schemaRef ds:uri="http://schemas.microsoft.com/office/2006/metadata/contentType"/>
@@ -30923,6 +30924,14 @@
 </ds:datastoreItem>
 </file>
 
+<file path=customXml/itemProps2.xml><?xml version="1.0" encoding="utf-8"?>
+<ds:datastoreItem xmlns:ds="http://schemas.openxmlformats.org/officeDocument/2006/customXml" ds:itemID="{2FD05317-60D6-4B3A-8545-888496D1A8EC}">
+  <ds:schemaRefs>
+    <ds:schemaRef ds:uri="http://schemas.microsoft.com/sharepoint/v3/contenttype/forms"/>
+  </ds:schemaRefs>
+</ds:datastoreItem>
+</file>
+
 <file path=customXml/itemProps3.xml><?xml version="1.0" encoding="utf-8"?>
 <ds:datastoreItem xmlns:ds="http://schemas.openxmlformats.org/officeDocument/2006/customXml" ds:itemID="{EF609EDA-869E-4BE5-AE5D-B898C584B6FF}">
   <ds:schemaRefs>

</xml_diff>